<commit_message>
commit before changing power up to auto activate
</commit_message>
<xml_diff>
--- a/Assets/Icon/‏‏מצגת של Microsoft PowerPoint חדש.pptx
+++ b/Assets/Icon/‏‏מצגת של Microsoft PowerPoint חדש.pptx
@@ -5,7 +5,10 @@
     <p:sldMasterId id="2147483648" r:id="rId1"/>
   </p:sldMasterIdLst>
   <p:sldIdLst>
-    <p:sldId id="256" r:id="rId2"/>
+    <p:sldId id="257" r:id="rId2"/>
+    <p:sldId id="256" r:id="rId3"/>
+    <p:sldId id="259" r:id="rId4"/>
+    <p:sldId id="258" r:id="rId5"/>
   </p:sldIdLst>
   <p:sldSz cx="12192000" cy="6858000"/>
   <p:notesSz cx="6858000" cy="9144000"/>
@@ -104,6 +107,11 @@
       </a:defRPr>
     </a:lvl9pPr>
   </p:defaultTextStyle>
+  <p:extLst>
+    <p:ext uri="{EFAFB233-063F-42B5-8137-9DF3F51BA10A}">
+      <p15:sldGuideLst xmlns:p15="http://schemas.microsoft.com/office/powerpoint/2012/main"/>
+    </p:ext>
+  </p:extLst>
 </p:presentation>
 </file>
 
@@ -254,7 +262,7 @@
           <a:p>
             <a:fld id="{CF14A1C1-A14E-43F7-93D6-A13D5373CCD4}" type="datetimeFigureOut">
               <a:rPr lang="he-IL" smtClean="0"/>
-              <a:t>י"א/תשרי/תשפ"ג</a:t>
+              <a:t>י"ד/תשרי/תשפ"ג</a:t>
             </a:fld>
             <a:endParaRPr lang="he-IL"/>
           </a:p>
@@ -452,7 +460,7 @@
           <a:p>
             <a:fld id="{CF14A1C1-A14E-43F7-93D6-A13D5373CCD4}" type="datetimeFigureOut">
               <a:rPr lang="he-IL" smtClean="0"/>
-              <a:t>י"א/תשרי/תשפ"ג</a:t>
+              <a:t>י"ד/תשרי/תשפ"ג</a:t>
             </a:fld>
             <a:endParaRPr lang="he-IL"/>
           </a:p>
@@ -660,7 +668,7 @@
           <a:p>
             <a:fld id="{CF14A1C1-A14E-43F7-93D6-A13D5373CCD4}" type="datetimeFigureOut">
               <a:rPr lang="he-IL" smtClean="0"/>
-              <a:t>י"א/תשרי/תשפ"ג</a:t>
+              <a:t>י"ד/תשרי/תשפ"ג</a:t>
             </a:fld>
             <a:endParaRPr lang="he-IL"/>
           </a:p>
@@ -858,7 +866,7 @@
           <a:p>
             <a:fld id="{CF14A1C1-A14E-43F7-93D6-A13D5373CCD4}" type="datetimeFigureOut">
               <a:rPr lang="he-IL" smtClean="0"/>
-              <a:t>י"א/תשרי/תשפ"ג</a:t>
+              <a:t>י"ד/תשרי/תשפ"ג</a:t>
             </a:fld>
             <a:endParaRPr lang="he-IL"/>
           </a:p>
@@ -1133,7 +1141,7 @@
           <a:p>
             <a:fld id="{CF14A1C1-A14E-43F7-93D6-A13D5373CCD4}" type="datetimeFigureOut">
               <a:rPr lang="he-IL" smtClean="0"/>
-              <a:t>י"א/תשרי/תשפ"ג</a:t>
+              <a:t>י"ד/תשרי/תשפ"ג</a:t>
             </a:fld>
             <a:endParaRPr lang="he-IL"/>
           </a:p>
@@ -1398,7 +1406,7 @@
           <a:p>
             <a:fld id="{CF14A1C1-A14E-43F7-93D6-A13D5373CCD4}" type="datetimeFigureOut">
               <a:rPr lang="he-IL" smtClean="0"/>
-              <a:t>י"א/תשרי/תשפ"ג</a:t>
+              <a:t>י"ד/תשרי/תשפ"ג</a:t>
             </a:fld>
             <a:endParaRPr lang="he-IL"/>
           </a:p>
@@ -1810,7 +1818,7 @@
           <a:p>
             <a:fld id="{CF14A1C1-A14E-43F7-93D6-A13D5373CCD4}" type="datetimeFigureOut">
               <a:rPr lang="he-IL" smtClean="0"/>
-              <a:t>י"א/תשרי/תשפ"ג</a:t>
+              <a:t>י"ד/תשרי/תשפ"ג</a:t>
             </a:fld>
             <a:endParaRPr lang="he-IL"/>
           </a:p>
@@ -1951,7 +1959,7 @@
           <a:p>
             <a:fld id="{CF14A1C1-A14E-43F7-93D6-A13D5373CCD4}" type="datetimeFigureOut">
               <a:rPr lang="he-IL" smtClean="0"/>
-              <a:t>י"א/תשרי/תשפ"ג</a:t>
+              <a:t>י"ד/תשרי/תשפ"ג</a:t>
             </a:fld>
             <a:endParaRPr lang="he-IL"/>
           </a:p>
@@ -2064,7 +2072,7 @@
           <a:p>
             <a:fld id="{CF14A1C1-A14E-43F7-93D6-A13D5373CCD4}" type="datetimeFigureOut">
               <a:rPr lang="he-IL" smtClean="0"/>
-              <a:t>י"א/תשרי/תשפ"ג</a:t>
+              <a:t>י"ד/תשרי/תשפ"ג</a:t>
             </a:fld>
             <a:endParaRPr lang="he-IL"/>
           </a:p>
@@ -2375,7 +2383,7 @@
           <a:p>
             <a:fld id="{CF14A1C1-A14E-43F7-93D6-A13D5373CCD4}" type="datetimeFigureOut">
               <a:rPr lang="he-IL" smtClean="0"/>
-              <a:t>י"א/תשרי/תשפ"ג</a:t>
+              <a:t>י"ד/תשרי/תשפ"ג</a:t>
             </a:fld>
             <a:endParaRPr lang="he-IL"/>
           </a:p>
@@ -2663,7 +2671,7 @@
           <a:p>
             <a:fld id="{CF14A1C1-A14E-43F7-93D6-A13D5373CCD4}" type="datetimeFigureOut">
               <a:rPr lang="he-IL" smtClean="0"/>
-              <a:t>י"א/תשרי/תשפ"ג</a:t>
+              <a:t>י"ד/תשרי/תשפ"ג</a:t>
             </a:fld>
             <a:endParaRPr lang="he-IL"/>
           </a:p>
@@ -2904,7 +2912,7 @@
           <a:p>
             <a:fld id="{CF14A1C1-A14E-43F7-93D6-A13D5373CCD4}" type="datetimeFigureOut">
               <a:rPr lang="he-IL" smtClean="0"/>
-              <a:t>י"א/תשרי/תשפ"ג</a:t>
+              <a:t>י"ד/תשרי/תשפ"ג</a:t>
             </a:fld>
             <a:endParaRPr lang="he-IL"/>
           </a:p>
@@ -3321,6 +3329,72 @@
           <a:chExt cx="0" cy="0"/>
         </a:xfrm>
       </p:grpSpPr>
+      <p:sp>
+        <p:nvSpPr>
+          <p:cNvPr id="2" name="כותרת 1">
+            <a:extLst>
+              <a:ext uri="{FF2B5EF4-FFF2-40B4-BE49-F238E27FC236}">
+                <a16:creationId xmlns:a16="http://schemas.microsoft.com/office/drawing/2014/main" id="{A26330FE-888C-C0AC-DB39-2BA37FFF02E5}"/>
+              </a:ext>
+            </a:extLst>
+          </p:cNvPr>
+          <p:cNvSpPr>
+            <a:spLocks noGrp="1"/>
+          </p:cNvSpPr>
+          <p:nvPr>
+            <p:ph type="ctrTitle"/>
+          </p:nvPr>
+        </p:nvSpPr>
+        <p:spPr>
+          <a:xfrm>
+            <a:off x="1648287" y="2560545"/>
+            <a:ext cx="9144000" cy="2387600"/>
+          </a:xfrm>
+        </p:spPr>
+        <p:txBody>
+          <a:bodyPr>
+            <a:noAutofit/>
+          </a:bodyPr>
+          <a:lstStyle/>
+          <a:p>
+            <a:r>
+              <a:rPr lang="en-US" sz="25800" dirty="0"/>
+              <a:t>Icon</a:t>
+            </a:r>
+            <a:endParaRPr lang="he-IL" sz="25800" dirty="0"/>
+          </a:p>
+        </p:txBody>
+      </p:sp>
+    </p:spTree>
+    <p:extLst>
+      <p:ext uri="{BB962C8B-B14F-4D97-AF65-F5344CB8AC3E}">
+        <p14:creationId xmlns:p14="http://schemas.microsoft.com/office/powerpoint/2010/main" val="2143459424"/>
+      </p:ext>
+    </p:extLst>
+  </p:cSld>
+  <p:clrMapOvr>
+    <a:masterClrMapping/>
+  </p:clrMapOvr>
+</p:sld>
+</file>
+
+<file path=ppt/slides/slide2.xml><?xml version="1.0" encoding="utf-8"?>
+<p:sld xmlns:a="http://schemas.openxmlformats.org/drawingml/2006/main" xmlns:r="http://schemas.openxmlformats.org/officeDocument/2006/relationships" xmlns:p="http://schemas.openxmlformats.org/presentationml/2006/main">
+  <p:cSld>
+    <p:spTree>
+      <p:nvGrpSpPr>
+        <p:cNvPr id="1" name=""/>
+        <p:cNvGrpSpPr/>
+        <p:nvPr/>
+      </p:nvGrpSpPr>
+      <p:grpSpPr>
+        <a:xfrm>
+          <a:off x="0" y="0"/>
+          <a:ext cx="0" cy="0"/>
+          <a:chOff x="0" y="0"/>
+          <a:chExt cx="0" cy="0"/>
+        </a:xfrm>
+      </p:grpSpPr>
       <p:pic>
         <p:nvPicPr>
           <p:cNvPr id="6" name="תמונה 5" descr="תמונה שמכילה טבע, שקיעה, שמי הלילה&#10;&#10;התיאור נוצר באופן אוטומטי">
@@ -3619,6 +3693,138 @@
     <p:extLst>
       <p:ext uri="{BB962C8B-B14F-4D97-AF65-F5344CB8AC3E}">
         <p14:creationId xmlns:p14="http://schemas.microsoft.com/office/powerpoint/2010/main" val="1856014664"/>
+      </p:ext>
+    </p:extLst>
+  </p:cSld>
+  <p:clrMapOvr>
+    <a:masterClrMapping/>
+  </p:clrMapOvr>
+</p:sld>
+</file>
+
+<file path=ppt/slides/slide3.xml><?xml version="1.0" encoding="utf-8"?>
+<p:sld xmlns:a="http://schemas.openxmlformats.org/drawingml/2006/main" xmlns:r="http://schemas.openxmlformats.org/officeDocument/2006/relationships" xmlns:p="http://schemas.openxmlformats.org/presentationml/2006/main">
+  <p:cSld>
+    <p:spTree>
+      <p:nvGrpSpPr>
+        <p:cNvPr id="1" name=""/>
+        <p:cNvGrpSpPr/>
+        <p:nvPr/>
+      </p:nvGrpSpPr>
+      <p:grpSpPr>
+        <a:xfrm>
+          <a:off x="0" y="0"/>
+          <a:ext cx="0" cy="0"/>
+          <a:chOff x="0" y="0"/>
+          <a:chExt cx="0" cy="0"/>
+        </a:xfrm>
+      </p:grpSpPr>
+      <p:pic>
+        <p:nvPicPr>
+          <p:cNvPr id="9" name="תמונה 8">
+            <a:extLst>
+              <a:ext uri="{FF2B5EF4-FFF2-40B4-BE49-F238E27FC236}">
+                <a16:creationId xmlns:a16="http://schemas.microsoft.com/office/drawing/2014/main" id="{7CBC5BEC-9A97-3B21-CA38-74978C3ED07F}"/>
+              </a:ext>
+            </a:extLst>
+          </p:cNvPr>
+          <p:cNvPicPr>
+            <a:picLocks noChangeAspect="1"/>
+          </p:cNvPicPr>
+          <p:nvPr/>
+        </p:nvPicPr>
+        <p:blipFill>
+          <a:blip r:embed="rId2">
+            <a:extLst>
+              <a:ext uri="{28A0092B-C50C-407E-A947-70E740481C1C}">
+                <a14:useLocalDpi xmlns:a14="http://schemas.microsoft.com/office/drawing/2010/main" val="0"/>
+              </a:ext>
+            </a:extLst>
+          </a:blip>
+          <a:stretch>
+            <a:fillRect/>
+          </a:stretch>
+        </p:blipFill>
+        <p:spPr>
+          <a:xfrm>
+            <a:off x="3662023" y="990259"/>
+            <a:ext cx="4867954" cy="4877481"/>
+          </a:xfrm>
+          <a:prstGeom prst="rect">
+            <a:avLst/>
+          </a:prstGeom>
+        </p:spPr>
+      </p:pic>
+    </p:spTree>
+    <p:extLst>
+      <p:ext uri="{BB962C8B-B14F-4D97-AF65-F5344CB8AC3E}">
+        <p14:creationId xmlns:p14="http://schemas.microsoft.com/office/powerpoint/2010/main" val="3175316003"/>
+      </p:ext>
+    </p:extLst>
+  </p:cSld>
+  <p:clrMapOvr>
+    <a:masterClrMapping/>
+  </p:clrMapOvr>
+</p:sld>
+</file>
+
+<file path=ppt/slides/slide4.xml><?xml version="1.0" encoding="utf-8"?>
+<p:sld xmlns:a="http://schemas.openxmlformats.org/drawingml/2006/main" xmlns:r="http://schemas.openxmlformats.org/officeDocument/2006/relationships" xmlns:p="http://schemas.openxmlformats.org/presentationml/2006/main">
+  <p:cSld>
+    <p:spTree>
+      <p:nvGrpSpPr>
+        <p:cNvPr id="1" name=""/>
+        <p:cNvGrpSpPr/>
+        <p:nvPr/>
+      </p:nvGrpSpPr>
+      <p:grpSpPr>
+        <a:xfrm>
+          <a:off x="0" y="0"/>
+          <a:ext cx="0" cy="0"/>
+          <a:chOff x="0" y="0"/>
+          <a:chExt cx="0" cy="0"/>
+        </a:xfrm>
+      </p:grpSpPr>
+      <p:sp>
+        <p:nvSpPr>
+          <p:cNvPr id="2" name="כותרת 1">
+            <a:extLst>
+              <a:ext uri="{FF2B5EF4-FFF2-40B4-BE49-F238E27FC236}">
+                <a16:creationId xmlns:a16="http://schemas.microsoft.com/office/drawing/2014/main" id="{A26330FE-888C-C0AC-DB39-2BA37FFF02E5}"/>
+              </a:ext>
+            </a:extLst>
+          </p:cNvPr>
+          <p:cNvSpPr>
+            <a:spLocks noGrp="1"/>
+          </p:cNvSpPr>
+          <p:nvPr>
+            <p:ph type="ctrTitle"/>
+          </p:nvPr>
+        </p:nvSpPr>
+        <p:spPr>
+          <a:xfrm>
+            <a:off x="1683797" y="2560545"/>
+            <a:ext cx="10185647" cy="2387600"/>
+          </a:xfrm>
+        </p:spPr>
+        <p:txBody>
+          <a:bodyPr>
+            <a:noAutofit/>
+          </a:bodyPr>
+          <a:lstStyle/>
+          <a:p>
+            <a:r>
+              <a:rPr lang="en-US" sz="25800" dirty="0"/>
+              <a:t>Photos</a:t>
+            </a:r>
+            <a:endParaRPr lang="he-IL" sz="25800" dirty="0"/>
+          </a:p>
+        </p:txBody>
+      </p:sp>
+    </p:spTree>
+    <p:extLst>
+      <p:ext uri="{BB962C8B-B14F-4D97-AF65-F5344CB8AC3E}">
+        <p14:creationId xmlns:p14="http://schemas.microsoft.com/office/powerpoint/2010/main" val="1817755669"/>
       </p:ext>
     </p:extLst>
   </p:cSld>

</xml_diff>